<commit_message>
update format document, update daftar listing, dftar tabel daftra gambar
</commit_message>
<xml_diff>
--- a/document/LSTA/160716053_DanielBualaKristoZalukhu_PPT.pptx
+++ b/document/LSTA/160716053_DanielBualaKristoZalukhu_PPT.pptx
@@ -8825,7 +8825,7 @@
           <a:p>
             <a:fld id="{7DC77CA3-9AF3-4BE8-B266-CA4BA6C39EB5}" type="datetimeFigureOut">
               <a:rPr lang="en-US" smtClean="0"/>
-              <a:t>6/22/2020</a:t>
+              <a:t>6/28/2020</a:t>
             </a:fld>
             <a:endParaRPr lang="en-US"/>
           </a:p>
@@ -9265,7 +9265,7 @@
           <a:p>
             <a:fld id="{5F99840B-E1A0-4B53-BA95-4697CB18CCDE}" type="datetimeFigureOut">
               <a:rPr lang="en-US" smtClean="0"/>
-              <a:t>6/22/2020</a:t>
+              <a:t>6/28/2020</a:t>
             </a:fld>
             <a:endParaRPr lang="en-US"/>
           </a:p>
@@ -9595,7 +9595,7 @@
           <a:p>
             <a:fld id="{5F99840B-E1A0-4B53-BA95-4697CB18CCDE}" type="datetimeFigureOut">
               <a:rPr lang="en-US" smtClean="0"/>
-              <a:t>6/22/2020</a:t>
+              <a:t>6/28/2020</a:t>
             </a:fld>
             <a:endParaRPr lang="en-US"/>
           </a:p>
@@ -9775,7 +9775,7 @@
           <a:p>
             <a:fld id="{5F99840B-E1A0-4B53-BA95-4697CB18CCDE}" type="datetimeFigureOut">
               <a:rPr lang="en-US" smtClean="0"/>
-              <a:t>6/22/2020</a:t>
+              <a:t>6/28/2020</a:t>
             </a:fld>
             <a:endParaRPr lang="en-US"/>
           </a:p>
@@ -9945,7 +9945,7 @@
           <a:p>
             <a:fld id="{5F99840B-E1A0-4B53-BA95-4697CB18CCDE}" type="datetimeFigureOut">
               <a:rPr lang="en-US" smtClean="0"/>
-              <a:t>6/22/2020</a:t>
+              <a:t>6/28/2020</a:t>
             </a:fld>
             <a:endParaRPr lang="en-US"/>
           </a:p>
@@ -10222,7 +10222,7 @@
           <a:p>
             <a:fld id="{5F99840B-E1A0-4B53-BA95-4697CB18CCDE}" type="datetimeFigureOut">
               <a:rPr lang="en-US" smtClean="0"/>
-              <a:t>6/22/2020</a:t>
+              <a:t>6/28/2020</a:t>
             </a:fld>
             <a:endParaRPr lang="en-US"/>
           </a:p>
@@ -10616,7 +10616,7 @@
           <a:p>
             <a:fld id="{5F99840B-E1A0-4B53-BA95-4697CB18CCDE}" type="datetimeFigureOut">
               <a:rPr lang="en-US" smtClean="0"/>
-              <a:t>6/22/2020</a:t>
+              <a:t>6/28/2020</a:t>
             </a:fld>
             <a:endParaRPr lang="en-US"/>
           </a:p>
@@ -11093,7 +11093,7 @@
           <a:p>
             <a:fld id="{5F99840B-E1A0-4B53-BA95-4697CB18CCDE}" type="datetimeFigureOut">
               <a:rPr lang="en-US" smtClean="0"/>
-              <a:t>6/22/2020</a:t>
+              <a:t>6/28/2020</a:t>
             </a:fld>
             <a:endParaRPr lang="en-US"/>
           </a:p>
@@ -11211,7 +11211,7 @@
           <a:p>
             <a:fld id="{5F99840B-E1A0-4B53-BA95-4697CB18CCDE}" type="datetimeFigureOut">
               <a:rPr lang="en-US" smtClean="0"/>
-              <a:t>6/22/2020</a:t>
+              <a:t>6/28/2020</a:t>
             </a:fld>
             <a:endParaRPr lang="en-US"/>
           </a:p>
@@ -11306,7 +11306,7 @@
           <a:p>
             <a:fld id="{5F99840B-E1A0-4B53-BA95-4697CB18CCDE}" type="datetimeFigureOut">
               <a:rPr lang="en-US" smtClean="0"/>
-              <a:t>6/22/2020</a:t>
+              <a:t>6/28/2020</a:t>
             </a:fld>
             <a:endParaRPr lang="en-US"/>
           </a:p>
@@ -11652,7 +11652,7 @@
           <a:p>
             <a:fld id="{5F99840B-E1A0-4B53-BA95-4697CB18CCDE}" type="datetimeFigureOut">
               <a:rPr lang="en-US" smtClean="0"/>
-              <a:t>6/22/2020</a:t>
+              <a:t>6/28/2020</a:t>
             </a:fld>
             <a:endParaRPr lang="en-US"/>
           </a:p>
@@ -12040,7 +12040,7 @@
           <a:p>
             <a:fld id="{5F99840B-E1A0-4B53-BA95-4697CB18CCDE}" type="datetimeFigureOut">
               <a:rPr lang="en-US" smtClean="0"/>
-              <a:t>6/22/2020</a:t>
+              <a:t>6/28/2020</a:t>
             </a:fld>
             <a:endParaRPr lang="en-US"/>
           </a:p>
@@ -12318,7 +12318,7 @@
           <a:p>
             <a:fld id="{5F99840B-E1A0-4B53-BA95-4697CB18CCDE}" type="datetimeFigureOut">
               <a:rPr lang="en-US" smtClean="0"/>
-              <a:t>6/22/2020</a:t>
+              <a:t>6/28/2020</a:t>
             </a:fld>
             <a:endParaRPr lang="en-US"/>
           </a:p>
@@ -13074,21 +13074,42 @@
           </a:p>
         </p:txBody>
       </p:sp>
-      <p:pic>
-        <p:nvPicPr>
-          <p:cNvPr id="5" name="Content Placeholder 4" descr="A close up of a map&#10;&#10;Description automatically generated">
+      <p:sp>
+        <p:nvSpPr>
+          <p:cNvPr id="4" name="Content Placeholder 3">
             <a:extLst>
               <a:ext uri="{FF2B5EF4-FFF2-40B4-BE49-F238E27FC236}">
-                <a16:creationId xmlns:a16="http://schemas.microsoft.com/office/drawing/2014/main" id="{8F6DF32A-5080-40CA-93BE-289665CFB20D}"/>
+                <a16:creationId xmlns:a16="http://schemas.microsoft.com/office/drawing/2014/main" id="{91E5153D-5D07-407F-87E7-908C567FD9AD}"/>
               </a:ext>
             </a:extLst>
           </p:cNvPr>
-          <p:cNvPicPr>
-            <a:picLocks noGrp="1" noChangeAspect="1"/>
-          </p:cNvPicPr>
+          <p:cNvSpPr>
+            <a:spLocks noGrp="1"/>
+          </p:cNvSpPr>
           <p:nvPr>
             <p:ph idx="1"/>
           </p:nvPr>
+        </p:nvSpPr>
+        <p:spPr/>
+        <p:txBody>
+          <a:bodyPr/>
+          <a:lstStyle/>
+          <a:p>
+            <a:endParaRPr lang="en-ID"/>
+          </a:p>
+        </p:txBody>
+      </p:sp>
+      <p:pic>
+        <p:nvPicPr>
+          <p:cNvPr id="6" name="Picture 5">
+            <a:extLst>
+              <a:ext uri="{FF2B5EF4-FFF2-40B4-BE49-F238E27FC236}">
+                <a16:creationId xmlns:a16="http://schemas.microsoft.com/office/drawing/2014/main" id="{1FF39703-D794-406A-A874-48A11F6751FF}"/>
+              </a:ext>
+            </a:extLst>
+          </p:cNvPr>
+          <p:cNvPicPr/>
+          <p:nvPr/>
         </p:nvPicPr>
         <p:blipFill>
           <a:blip r:embed="rId2">
@@ -13104,9 +13125,17 @@
         </p:blipFill>
         <p:spPr>
           <a:xfrm>
-            <a:off x="2079522" y="866970"/>
-            <a:ext cx="8568813" cy="5755055"/>
+            <a:off x="1727200" y="855406"/>
+            <a:ext cx="9486900" cy="5532694"/>
           </a:xfrm>
+          <a:prstGeom prst="rect">
+            <a:avLst/>
+          </a:prstGeom>
+          <a:ln>
+            <a:solidFill>
+              <a:schemeClr val="tx1"/>
+            </a:solidFill>
+          </a:ln>
         </p:spPr>
       </p:pic>
     </p:spTree>

</xml_diff>